<commit_message>
changed visual in demo day deck
</commit_message>
<xml_diff>
--- a/demo_day_deck.pptx
+++ b/demo_day_deck.pptx
@@ -11,8 +11,8 @@
     <p:sldId id="256" r:id="rId2"/>
     <p:sldId id="258" r:id="rId3"/>
     <p:sldId id="271" r:id="rId4"/>
-    <p:sldId id="276" r:id="rId5"/>
-    <p:sldId id="260" r:id="rId6"/>
+    <p:sldId id="260" r:id="rId5"/>
+    <p:sldId id="276" r:id="rId6"/>
     <p:sldId id="262" r:id="rId7"/>
     <p:sldId id="263" r:id="rId8"/>
     <p:sldId id="264" r:id="rId9"/>
@@ -4131,10 +4131,10 @@
         <a:lstStyle/>
         <a:p>
           <a:r>
-            <a:rPr lang="en-US" sz="2400" dirty="0" smtClean="0"/>
+            <a:rPr lang="en-US" sz="1800" dirty="0" smtClean="0"/>
             <a:t>% Negative</a:t>
           </a:r>
-          <a:endParaRPr lang="en-US" sz="2400" dirty="0"/>
+          <a:endParaRPr lang="en-US" sz="1800" dirty="0"/>
         </a:p>
       </dgm:t>
     </dgm:pt>
@@ -4172,10 +4172,10 @@
         <a:lstStyle/>
         <a:p>
           <a:r>
-            <a:rPr lang="en-US" sz="2400" dirty="0" smtClean="0"/>
+            <a:rPr lang="en-US" sz="1800" dirty="0" smtClean="0"/>
             <a:t>% Neutral</a:t>
           </a:r>
-          <a:endParaRPr lang="en-US" sz="2400" dirty="0"/>
+          <a:endParaRPr lang="en-US" sz="1800" dirty="0"/>
         </a:p>
       </dgm:t>
     </dgm:pt>
@@ -4213,10 +4213,10 @@
         <a:lstStyle/>
         <a:p>
           <a:r>
-            <a:rPr lang="en-US" sz="2400" dirty="0" smtClean="0"/>
+            <a:rPr lang="en-US" sz="1800" dirty="0" smtClean="0"/>
             <a:t>% Positive</a:t>
           </a:r>
-          <a:endParaRPr lang="en-US" sz="2400" dirty="0"/>
+          <a:endParaRPr lang="en-US" sz="1800" dirty="0"/>
         </a:p>
       </dgm:t>
     </dgm:pt>
@@ -6431,8 +6431,8 @@
       </dsp:nvSpPr>
       <dsp:spPr>
         <a:xfrm>
-          <a:off x="21516" y="1326"/>
-          <a:ext cx="1650699" cy="875724"/>
+          <a:off x="16081" y="1088"/>
+          <a:ext cx="1253308" cy="718588"/>
         </a:xfrm>
         <a:prstGeom prst="rect">
           <a:avLst/>
@@ -6468,12 +6468,12 @@
         </a:fontRef>
       </dsp:style>
       <dsp:txBody>
-        <a:bodyPr spcFirstLastPara="0" vert="horz" wrap="square" lIns="60960" tIns="60960" rIns="60960" bIns="60960" numCol="1" spcCol="1270" anchor="ctr" anchorCtr="0">
+        <a:bodyPr spcFirstLastPara="0" vert="horz" wrap="square" lIns="45720" tIns="45720" rIns="45720" bIns="45720" numCol="1" spcCol="1270" anchor="ctr" anchorCtr="0">
           <a:noAutofit/>
         </a:bodyPr>
         <a:lstStyle/>
         <a:p>
-          <a:pPr lvl="0" algn="ctr" defTabSz="1066800">
+          <a:pPr lvl="0" algn="ctr" defTabSz="800100">
             <a:lnSpc>
               <a:spcPct val="90000"/>
             </a:lnSpc>
@@ -6485,15 +6485,15 @@
             </a:spcAft>
           </a:pPr>
           <a:r>
-            <a:rPr lang="en-US" sz="2400" kern="1200" dirty="0" smtClean="0"/>
+            <a:rPr lang="en-US" sz="1800" kern="1200" dirty="0" smtClean="0"/>
             <a:t>% Negative</a:t>
           </a:r>
-          <a:endParaRPr lang="en-US" sz="2400" kern="1200" dirty="0"/>
+          <a:endParaRPr lang="en-US" sz="1800" kern="1200" dirty="0"/>
         </a:p>
       </dsp:txBody>
       <dsp:txXfrm>
-        <a:off x="21516" y="1326"/>
-        <a:ext cx="1650699" cy="875724"/>
+        <a:off x="16081" y="1088"/>
+        <a:ext cx="1253308" cy="718588"/>
       </dsp:txXfrm>
     </dsp:sp>
     <dsp:sp modelId="{A32D7302-1E56-41F3-AB88-410BB8386781}">
@@ -6503,8 +6503,8 @@
       </dsp:nvSpPr>
       <dsp:spPr>
         <a:xfrm>
-          <a:off x="4780" y="920837"/>
-          <a:ext cx="1662654" cy="875724"/>
+          <a:off x="15621" y="755606"/>
+          <a:ext cx="1238146" cy="718588"/>
         </a:xfrm>
         <a:prstGeom prst="rect">
           <a:avLst/>
@@ -6540,12 +6540,12 @@
         </a:fontRef>
       </dsp:style>
       <dsp:txBody>
-        <a:bodyPr spcFirstLastPara="0" vert="horz" wrap="square" lIns="60960" tIns="60960" rIns="60960" bIns="60960" numCol="1" spcCol="1270" anchor="ctr" anchorCtr="0">
+        <a:bodyPr spcFirstLastPara="0" vert="horz" wrap="square" lIns="45720" tIns="45720" rIns="45720" bIns="45720" numCol="1" spcCol="1270" anchor="ctr" anchorCtr="0">
           <a:noAutofit/>
         </a:bodyPr>
         <a:lstStyle/>
         <a:p>
-          <a:pPr lvl="0" algn="ctr" defTabSz="1066800">
+          <a:pPr lvl="0" algn="ctr" defTabSz="800100">
             <a:lnSpc>
               <a:spcPct val="90000"/>
             </a:lnSpc>
@@ -6557,15 +6557,15 @@
             </a:spcAft>
           </a:pPr>
           <a:r>
-            <a:rPr lang="en-US" sz="2400" kern="1200" dirty="0" smtClean="0"/>
+            <a:rPr lang="en-US" sz="1800" kern="1200" dirty="0" smtClean="0"/>
             <a:t>% Neutral</a:t>
           </a:r>
-          <a:endParaRPr lang="en-US" sz="2400" kern="1200" dirty="0"/>
+          <a:endParaRPr lang="en-US" sz="1800" kern="1200" dirty="0"/>
         </a:p>
       </dsp:txBody>
       <dsp:txXfrm>
-        <a:off x="4780" y="920837"/>
-        <a:ext cx="1662654" cy="875724"/>
+        <a:off x="15621" y="755606"/>
+        <a:ext cx="1238146" cy="718588"/>
       </dsp:txXfrm>
     </dsp:sp>
     <dsp:sp modelId="{7759F700-81ED-4187-B367-53D3CFB4C2CF}">
@@ -6575,8 +6575,8 @@
       </dsp:nvSpPr>
       <dsp:spPr>
         <a:xfrm>
-          <a:off x="0" y="1840348"/>
-          <a:ext cx="1672215" cy="875724"/>
+          <a:off x="3347" y="1510124"/>
+          <a:ext cx="1262694" cy="718588"/>
         </a:xfrm>
         <a:prstGeom prst="rect">
           <a:avLst/>
@@ -6612,12 +6612,12 @@
         </a:fontRef>
       </dsp:style>
       <dsp:txBody>
-        <a:bodyPr spcFirstLastPara="0" vert="horz" wrap="square" lIns="60960" tIns="60960" rIns="60960" bIns="60960" numCol="1" spcCol="1270" anchor="ctr" anchorCtr="0">
+        <a:bodyPr spcFirstLastPara="0" vert="horz" wrap="square" lIns="45720" tIns="45720" rIns="45720" bIns="45720" numCol="1" spcCol="1270" anchor="ctr" anchorCtr="0">
           <a:noAutofit/>
         </a:bodyPr>
         <a:lstStyle/>
         <a:p>
-          <a:pPr lvl="0" algn="ctr" defTabSz="1066800">
+          <a:pPr lvl="0" algn="ctr" defTabSz="800100">
             <a:lnSpc>
               <a:spcPct val="90000"/>
             </a:lnSpc>
@@ -6629,15 +6629,15 @@
             </a:spcAft>
           </a:pPr>
           <a:r>
-            <a:rPr lang="en-US" sz="2400" kern="1200" dirty="0" smtClean="0"/>
+            <a:rPr lang="en-US" sz="1800" kern="1200" dirty="0" smtClean="0"/>
             <a:t>% Positive</a:t>
           </a:r>
-          <a:endParaRPr lang="en-US" sz="2400" kern="1200" dirty="0"/>
+          <a:endParaRPr lang="en-US" sz="1800" kern="1200" dirty="0"/>
         </a:p>
       </dsp:txBody>
       <dsp:txXfrm>
-        <a:off x="0" y="1840348"/>
-        <a:ext cx="1672215" cy="875724"/>
+        <a:off x="3347" y="1510124"/>
+        <a:ext cx="1262694" cy="718588"/>
       </dsp:txXfrm>
     </dsp:sp>
   </dsp:spTree>
@@ -15540,140 +15540,6 @@
 </p:sldLayout>
 </file>
 
-<file path=ppt/slideLayouts/slideLayout10.xml><?xml version="1.0" encoding="utf-8"?>
-<p:sldLayout xmlns:a="http://schemas.openxmlformats.org/drawingml/2006/main" xmlns:r="http://schemas.openxmlformats.org/officeDocument/2006/relationships" xmlns:p="http://schemas.openxmlformats.org/presentationml/2006/main" type="tx">
-  <p:cSld name="Vertical Title and Text">
-    <p:spTree>
-      <p:nvGrpSpPr>
-        <p:cNvPr id="1" name=""/>
-        <p:cNvGrpSpPr/>
-        <p:nvPr/>
-      </p:nvGrpSpPr>
-      <p:grpSpPr>
-        <a:xfrm>
-          <a:off x="0" y="0"/>
-          <a:ext cx="0" cy="0"/>
-          <a:chOff x="0" y="0"/>
-          <a:chExt cx="0" cy="0"/>
-        </a:xfrm>
-      </p:grpSpPr>
-      <p:sp>
-        <p:nvSpPr>
-          <p:cNvPr id="114" name="Title Text"/>
-          <p:cNvSpPr txBox="1">
-            <a:spLocks noGrp="1"/>
-          </p:cNvSpPr>
-          <p:nvPr>
-            <p:ph type="title"/>
-          </p:nvPr>
-        </p:nvSpPr>
-        <p:spPr>
-          <a:xfrm>
-            <a:off x="9596560" y="624155"/>
-            <a:ext cx="1565767" cy="5243245"/>
-          </a:xfrm>
-          <a:prstGeom prst="rect">
-            <a:avLst/>
-          </a:prstGeom>
-        </p:spPr>
-        <p:txBody>
-          <a:bodyPr/>
-          <a:lstStyle/>
-          <a:p>
-            <a:r>
-              <a:t>Title Text</a:t>
-            </a:r>
-          </a:p>
-        </p:txBody>
-      </p:sp>
-      <p:sp>
-        <p:nvSpPr>
-          <p:cNvPr id="115" name="Body Level One…"/>
-          <p:cNvSpPr txBox="1">
-            <a:spLocks noGrp="1"/>
-          </p:cNvSpPr>
-          <p:nvPr>
-            <p:ph type="body" idx="1"/>
-          </p:nvPr>
-        </p:nvSpPr>
-        <p:spPr>
-          <a:xfrm>
-            <a:off x="1371600" y="624155"/>
-            <a:ext cx="8179642" cy="5243245"/>
-          </a:xfrm>
-          <a:prstGeom prst="rect">
-            <a:avLst/>
-          </a:prstGeom>
-        </p:spPr>
-        <p:txBody>
-          <a:bodyPr/>
-          <a:lstStyle/>
-          <a:p>
-            <a:r>
-              <a:t>Body Level One</a:t>
-            </a:r>
-          </a:p>
-          <a:p>
-            <a:pPr lvl="1"/>
-            <a:r>
-              <a:t>Body Level Two</a:t>
-            </a:r>
-          </a:p>
-          <a:p>
-            <a:pPr lvl="2"/>
-            <a:r>
-              <a:t>Body Level Three</a:t>
-            </a:r>
-          </a:p>
-          <a:p>
-            <a:pPr lvl="3"/>
-            <a:r>
-              <a:t>Body Level Four</a:t>
-            </a:r>
-          </a:p>
-          <a:p>
-            <a:pPr lvl="4"/>
-            <a:r>
-              <a:t>Body Level Five</a:t>
-            </a:r>
-          </a:p>
-        </p:txBody>
-      </p:sp>
-      <p:sp>
-        <p:nvSpPr>
-          <p:cNvPr id="116" name="Slide Number"/>
-          <p:cNvSpPr txBox="1">
-            <a:spLocks noGrp="1"/>
-          </p:cNvSpPr>
-          <p:nvPr>
-            <p:ph type="sldNum" sz="quarter" idx="2"/>
-          </p:nvPr>
-        </p:nvSpPr>
-        <p:spPr>
-          <a:prstGeom prst="rect">
-            <a:avLst/>
-          </a:prstGeom>
-        </p:spPr>
-        <p:txBody>
-          <a:bodyPr/>
-          <a:lstStyle/>
-          <a:p>
-            <a:fld id="{86CB4B4D-7CA3-9044-876B-883B54F8677D}" type="slidenum">
-              <a:t>‹#›</a:t>
-            </a:fld>
-            <a:endParaRPr/>
-          </a:p>
-        </p:txBody>
-      </p:sp>
-    </p:spTree>
-  </p:cSld>
-  <p:clrMapOvr>
-    <a:masterClrMapping/>
-  </p:clrMapOvr>
-  <p:transition spd="med"/>
-</p:sldLayout>
-</file>
-
 <file path=ppt/slideLayouts/slideLayout2.xml><?xml version="1.0" encoding="utf-8"?>
 <p:sldLayout xmlns:a="http://schemas.openxmlformats.org/drawingml/2006/main" xmlns:r="http://schemas.openxmlformats.org/officeDocument/2006/relationships" xmlns:p="http://schemas.openxmlformats.org/presentationml/2006/main" type="tx">
   <p:cSld name="Title and Content">
@@ -16266,240 +16132,6 @@
 
 <file path=ppt/slideLayouts/slideLayout5.xml><?xml version="1.0" encoding="utf-8"?>
 <p:sldLayout xmlns:a="http://schemas.openxmlformats.org/drawingml/2006/main" xmlns:r="http://schemas.openxmlformats.org/officeDocument/2006/relationships" xmlns:p="http://schemas.openxmlformats.org/presentationml/2006/main" type="tx">
-  <p:cSld name="Comparison">
-    <p:spTree>
-      <p:nvGrpSpPr>
-        <p:cNvPr id="1" name=""/>
-        <p:cNvGrpSpPr/>
-        <p:nvPr/>
-      </p:nvGrpSpPr>
-      <p:grpSpPr>
-        <a:xfrm>
-          <a:off x="0" y="0"/>
-          <a:ext cx="0" cy="0"/>
-          <a:chOff x="0" y="0"/>
-          <a:chExt cx="0" cy="0"/>
-        </a:xfrm>
-      </p:grpSpPr>
-      <p:sp>
-        <p:nvSpPr>
-          <p:cNvPr id="56" name="Title Text"/>
-          <p:cNvSpPr txBox="1">
-            <a:spLocks noGrp="1"/>
-          </p:cNvSpPr>
-          <p:nvPr>
-            <p:ph type="title"/>
-          </p:nvPr>
-        </p:nvSpPr>
-        <p:spPr>
-          <a:xfrm>
-            <a:off x="1371600" y="685800"/>
-            <a:ext cx="9601200" cy="1485900"/>
-          </a:xfrm>
-          <a:prstGeom prst="rect">
-            <a:avLst/>
-          </a:prstGeom>
-        </p:spPr>
-        <p:txBody>
-          <a:bodyPr/>
-          <a:lstStyle/>
-          <a:p>
-            <a:r>
-              <a:t>Title Text</a:t>
-            </a:r>
-          </a:p>
-        </p:txBody>
-      </p:sp>
-      <p:sp>
-        <p:nvSpPr>
-          <p:cNvPr id="57" name="Body Level One…"/>
-          <p:cNvSpPr txBox="1">
-            <a:spLocks noGrp="1"/>
-          </p:cNvSpPr>
-          <p:nvPr>
-            <p:ph type="body" sz="quarter" idx="1"/>
-          </p:nvPr>
-        </p:nvSpPr>
-        <p:spPr>
-          <a:xfrm>
-            <a:off x="1371600" y="2340864"/>
-            <a:ext cx="4443985" cy="823913"/>
-          </a:xfrm>
-          <a:prstGeom prst="rect">
-            <a:avLst/>
-          </a:prstGeom>
-        </p:spPr>
-        <p:txBody>
-          <a:bodyPr anchor="b"/>
-          <a:lstStyle>
-            <a:lvl1pPr marL="0" indent="0">
-              <a:lnSpc>
-                <a:spcPct val="84000"/>
-              </a:lnSpc>
-              <a:spcBef>
-                <a:spcPts val="0"/>
-              </a:spcBef>
-              <a:buSzTx/>
-              <a:buFontTx/>
-              <a:buNone/>
-              <a:defRPr sz="3000"/>
-            </a:lvl1pPr>
-            <a:lvl2pPr marL="0" indent="457200">
-              <a:lnSpc>
-                <a:spcPct val="84000"/>
-              </a:lnSpc>
-              <a:spcBef>
-                <a:spcPts val="0"/>
-              </a:spcBef>
-              <a:buSzTx/>
-              <a:buFontTx/>
-              <a:buNone/>
-              <a:defRPr sz="3000"/>
-            </a:lvl2pPr>
-            <a:lvl3pPr marL="0" indent="914400">
-              <a:lnSpc>
-                <a:spcPct val="84000"/>
-              </a:lnSpc>
-              <a:spcBef>
-                <a:spcPts val="0"/>
-              </a:spcBef>
-              <a:buSzTx/>
-              <a:buFontTx/>
-              <a:buNone/>
-              <a:defRPr sz="3000"/>
-            </a:lvl3pPr>
-            <a:lvl4pPr marL="0" indent="1371600">
-              <a:lnSpc>
-                <a:spcPct val="84000"/>
-              </a:lnSpc>
-              <a:spcBef>
-                <a:spcPts val="0"/>
-              </a:spcBef>
-              <a:buSzTx/>
-              <a:buFontTx/>
-              <a:buNone/>
-              <a:defRPr sz="3000"/>
-            </a:lvl4pPr>
-            <a:lvl5pPr marL="0" indent="1828800">
-              <a:lnSpc>
-                <a:spcPct val="84000"/>
-              </a:lnSpc>
-              <a:spcBef>
-                <a:spcPts val="0"/>
-              </a:spcBef>
-              <a:buSzTx/>
-              <a:buFontTx/>
-              <a:buNone/>
-              <a:defRPr sz="3000"/>
-            </a:lvl5pPr>
-          </a:lstStyle>
-          <a:p>
-            <a:r>
-              <a:t>Body Level One</a:t>
-            </a:r>
-          </a:p>
-          <a:p>
-            <a:pPr lvl="1"/>
-            <a:r>
-              <a:t>Body Level Two</a:t>
-            </a:r>
-          </a:p>
-          <a:p>
-            <a:pPr lvl="2"/>
-            <a:r>
-              <a:t>Body Level Three</a:t>
-            </a:r>
-          </a:p>
-          <a:p>
-            <a:pPr lvl="3"/>
-            <a:r>
-              <a:t>Body Level Four</a:t>
-            </a:r>
-          </a:p>
-          <a:p>
-            <a:pPr lvl="4"/>
-            <a:r>
-              <a:t>Body Level Five</a:t>
-            </a:r>
-          </a:p>
-        </p:txBody>
-      </p:sp>
-      <p:sp>
-        <p:nvSpPr>
-          <p:cNvPr id="58" name="Text Placeholder 4"/>
-          <p:cNvSpPr>
-            <a:spLocks noGrp="1"/>
-          </p:cNvSpPr>
-          <p:nvPr>
-            <p:ph type="body" sz="quarter" idx="13"/>
-          </p:nvPr>
-        </p:nvSpPr>
-        <p:spPr>
-          <a:xfrm>
-            <a:off x="6525014" y="2340864"/>
-            <a:ext cx="4443985" cy="823913"/>
-          </a:xfrm>
-          <a:prstGeom prst="rect">
-            <a:avLst/>
-          </a:prstGeom>
-        </p:spPr>
-        <p:txBody>
-          <a:bodyPr anchor="b"/>
-          <a:lstStyle/>
-          <a:p>
-            <a:pPr marL="0" indent="0">
-              <a:lnSpc>
-                <a:spcPct val="84000"/>
-              </a:lnSpc>
-              <a:spcBef>
-                <a:spcPts val="0"/>
-              </a:spcBef>
-              <a:buSzTx/>
-              <a:buFontTx/>
-              <a:buNone/>
-              <a:defRPr sz="3000"/>
-            </a:pPr>
-            <a:endParaRPr/>
-          </a:p>
-        </p:txBody>
-      </p:sp>
-      <p:sp>
-        <p:nvSpPr>
-          <p:cNvPr id="59" name="Slide Number"/>
-          <p:cNvSpPr txBox="1">
-            <a:spLocks noGrp="1"/>
-          </p:cNvSpPr>
-          <p:nvPr>
-            <p:ph type="sldNum" sz="quarter" idx="2"/>
-          </p:nvPr>
-        </p:nvSpPr>
-        <p:spPr>
-          <a:prstGeom prst="rect">
-            <a:avLst/>
-          </a:prstGeom>
-        </p:spPr>
-        <p:txBody>
-          <a:bodyPr/>
-          <a:lstStyle/>
-          <a:p>
-            <a:fld id="{86CB4B4D-7CA3-9044-876B-883B54F8677D}" type="slidenum">
-              <a:t>‹#›</a:t>
-            </a:fld>
-            <a:endParaRPr/>
-          </a:p>
-        </p:txBody>
-      </p:sp>
-    </p:spTree>
-  </p:cSld>
-  <p:clrMapOvr>
-    <a:masterClrMapping/>
-  </p:clrMapOvr>
-  <p:transition spd="med"/>
-</p:sldLayout>
-</file>
-
-<file path=ppt/slideLayouts/slideLayout6.xml><?xml version="1.0" encoding="utf-8"?>
-<p:sldLayout xmlns:a="http://schemas.openxmlformats.org/drawingml/2006/main" xmlns:r="http://schemas.openxmlformats.org/officeDocument/2006/relationships" xmlns:p="http://schemas.openxmlformats.org/presentationml/2006/main" type="tx">
   <p:cSld name="Title Only">
     <p:spTree>
       <p:nvGrpSpPr>
@@ -16579,7 +16211,7 @@
 </p:sldLayout>
 </file>
 
-<file path=ppt/slideLayouts/slideLayout7.xml><?xml version="1.0" encoding="utf-8"?>
+<file path=ppt/slideLayouts/slideLayout6.xml><?xml version="1.0" encoding="utf-8"?>
 <p:sldLayout xmlns:a="http://schemas.openxmlformats.org/drawingml/2006/main" xmlns:r="http://schemas.openxmlformats.org/officeDocument/2006/relationships" xmlns:p="http://schemas.openxmlformats.org/presentationml/2006/main" type="tx">
   <p:cSld name="Blank">
     <p:spTree>
@@ -16631,7 +16263,7 @@
 </p:sldLayout>
 </file>
 
-<file path=ppt/slideLayouts/slideLayout8.xml><?xml version="1.0" encoding="utf-8"?>
+<file path=ppt/slideLayouts/slideLayout7.xml><?xml version="1.0" encoding="utf-8"?>
 <p:sldLayout xmlns:a="http://schemas.openxmlformats.org/drawingml/2006/main" xmlns:r="http://schemas.openxmlformats.org/officeDocument/2006/relationships" xmlns:p="http://schemas.openxmlformats.org/presentationml/2006/main" showMasterSp="0" type="tx">
   <p:cSld name="Picture with Caption">
     <p:spTree>
@@ -16924,7 +16556,7 @@
 </p:sldLayout>
 </file>
 
-<file path=ppt/slideLayouts/slideLayout9.xml><?xml version="1.0" encoding="utf-8"?>
+<file path=ppt/slideLayouts/slideLayout8.xml><?xml version="1.0" encoding="utf-8"?>
 <p:sldLayout xmlns:a="http://schemas.openxmlformats.org/drawingml/2006/main" xmlns:r="http://schemas.openxmlformats.org/officeDocument/2006/relationships" xmlns:p="http://schemas.openxmlformats.org/presentationml/2006/main" type="tx">
   <p:cSld name="Title and Vertical Text">
     <p:spTree>
@@ -17058,6 +16690,140 @@
 </p:sldLayout>
 </file>
 
+<file path=ppt/slideLayouts/slideLayout9.xml><?xml version="1.0" encoding="utf-8"?>
+<p:sldLayout xmlns:a="http://schemas.openxmlformats.org/drawingml/2006/main" xmlns:r="http://schemas.openxmlformats.org/officeDocument/2006/relationships" xmlns:p="http://schemas.openxmlformats.org/presentationml/2006/main" type="tx">
+  <p:cSld name="Vertical Title and Text">
+    <p:spTree>
+      <p:nvGrpSpPr>
+        <p:cNvPr id="1" name=""/>
+        <p:cNvGrpSpPr/>
+        <p:nvPr/>
+      </p:nvGrpSpPr>
+      <p:grpSpPr>
+        <a:xfrm>
+          <a:off x="0" y="0"/>
+          <a:ext cx="0" cy="0"/>
+          <a:chOff x="0" y="0"/>
+          <a:chExt cx="0" cy="0"/>
+        </a:xfrm>
+      </p:grpSpPr>
+      <p:sp>
+        <p:nvSpPr>
+          <p:cNvPr id="114" name="Title Text"/>
+          <p:cNvSpPr txBox="1">
+            <a:spLocks noGrp="1"/>
+          </p:cNvSpPr>
+          <p:nvPr>
+            <p:ph type="title"/>
+          </p:nvPr>
+        </p:nvSpPr>
+        <p:spPr>
+          <a:xfrm>
+            <a:off x="9596560" y="624155"/>
+            <a:ext cx="1565767" cy="5243245"/>
+          </a:xfrm>
+          <a:prstGeom prst="rect">
+            <a:avLst/>
+          </a:prstGeom>
+        </p:spPr>
+        <p:txBody>
+          <a:bodyPr/>
+          <a:lstStyle/>
+          <a:p>
+            <a:r>
+              <a:t>Title Text</a:t>
+            </a:r>
+          </a:p>
+        </p:txBody>
+      </p:sp>
+      <p:sp>
+        <p:nvSpPr>
+          <p:cNvPr id="115" name="Body Level One…"/>
+          <p:cNvSpPr txBox="1">
+            <a:spLocks noGrp="1"/>
+          </p:cNvSpPr>
+          <p:nvPr>
+            <p:ph type="body" idx="1"/>
+          </p:nvPr>
+        </p:nvSpPr>
+        <p:spPr>
+          <a:xfrm>
+            <a:off x="1371600" y="624155"/>
+            <a:ext cx="8179642" cy="5243245"/>
+          </a:xfrm>
+          <a:prstGeom prst="rect">
+            <a:avLst/>
+          </a:prstGeom>
+        </p:spPr>
+        <p:txBody>
+          <a:bodyPr/>
+          <a:lstStyle/>
+          <a:p>
+            <a:r>
+              <a:t>Body Level One</a:t>
+            </a:r>
+          </a:p>
+          <a:p>
+            <a:pPr lvl="1"/>
+            <a:r>
+              <a:t>Body Level Two</a:t>
+            </a:r>
+          </a:p>
+          <a:p>
+            <a:pPr lvl="2"/>
+            <a:r>
+              <a:t>Body Level Three</a:t>
+            </a:r>
+          </a:p>
+          <a:p>
+            <a:pPr lvl="3"/>
+            <a:r>
+              <a:t>Body Level Four</a:t>
+            </a:r>
+          </a:p>
+          <a:p>
+            <a:pPr lvl="4"/>
+            <a:r>
+              <a:t>Body Level Five</a:t>
+            </a:r>
+          </a:p>
+        </p:txBody>
+      </p:sp>
+      <p:sp>
+        <p:nvSpPr>
+          <p:cNvPr id="116" name="Slide Number"/>
+          <p:cNvSpPr txBox="1">
+            <a:spLocks noGrp="1"/>
+          </p:cNvSpPr>
+          <p:nvPr>
+            <p:ph type="sldNum" sz="quarter" idx="2"/>
+          </p:nvPr>
+        </p:nvSpPr>
+        <p:spPr>
+          <a:prstGeom prst="rect">
+            <a:avLst/>
+          </a:prstGeom>
+        </p:spPr>
+        <p:txBody>
+          <a:bodyPr/>
+          <a:lstStyle/>
+          <a:p>
+            <a:fld id="{86CB4B4D-7CA3-9044-876B-883B54F8677D}" type="slidenum">
+              <a:t>‹#›</a:t>
+            </a:fld>
+            <a:endParaRPr/>
+          </a:p>
+        </p:txBody>
+      </p:sp>
+    </p:spTree>
+  </p:cSld>
+  <p:clrMapOvr>
+    <a:masterClrMapping/>
+  </p:clrMapOvr>
+  <p:transition spd="med"/>
+</p:sldLayout>
+</file>
+
 <file path=ppt/slideMasters/slideMaster1.xml><?xml version="1.0" encoding="utf-8"?>
 <p:sldMaster xmlns:a="http://schemas.openxmlformats.org/drawingml/2006/main" xmlns:r="http://schemas.openxmlformats.org/officeDocument/2006/relationships" xmlns:p="http://schemas.openxmlformats.org/presentationml/2006/main">
   <p:cSld>
@@ -17135,7 +16901,7 @@
           </a:ln>
           <a:extLst>
             <a:ext uri="{C572A759-6A51-4108-AA02-DFA0A04FC94B}">
-              <ma14:wrappingTextBoxFlag xmlns="" xmlns:m="http://schemas.openxmlformats.org/officeDocument/2006/math" xmlns:a14="http://schemas.microsoft.com/office/drawing/2010/main" xmlns:ma14="http://schemas.microsoft.com/office/mac/drawingml/2011/main" val="1"/>
+              <ma14:wrappingTextBoxFlag xmlns:ma14="http://schemas.microsoft.com/office/mac/drawingml/2011/main" xmlns:a14="http://schemas.microsoft.com/office/drawing/2010/main" xmlns:m="http://schemas.openxmlformats.org/officeDocument/2006/math" xmlns="" val="1"/>
             </a:ext>
           </a:extLst>
         </p:spPr>
@@ -17174,7 +16940,7 @@
           </a:ln>
           <a:extLst>
             <a:ext uri="{C572A759-6A51-4108-AA02-DFA0A04FC94B}">
-              <ma14:wrappingTextBoxFlag xmlns="" xmlns:m="http://schemas.openxmlformats.org/officeDocument/2006/math" xmlns:a14="http://schemas.microsoft.com/office/drawing/2010/main" xmlns:ma14="http://schemas.microsoft.com/office/mac/drawingml/2011/main" val="1"/>
+              <ma14:wrappingTextBoxFlag xmlns:ma14="http://schemas.microsoft.com/office/mac/drawingml/2011/main" xmlns:a14="http://schemas.microsoft.com/office/drawing/2010/main" xmlns:m="http://schemas.openxmlformats.org/officeDocument/2006/math" xmlns="" val="1"/>
             </a:ext>
           </a:extLst>
         </p:spPr>
@@ -17265,12 +17031,11 @@
     <p:sldLayoutId id="2147483650" r:id="rId2"/>
     <p:sldLayoutId id="2147483651" r:id="rId3"/>
     <p:sldLayoutId id="2147483652" r:id="rId4"/>
-    <p:sldLayoutId id="2147483653" r:id="rId5"/>
-    <p:sldLayoutId id="2147483654" r:id="rId6"/>
-    <p:sldLayoutId id="2147483655" r:id="rId7"/>
-    <p:sldLayoutId id="2147483657" r:id="rId8"/>
-    <p:sldLayoutId id="2147483658" r:id="rId9"/>
-    <p:sldLayoutId id="2147483659" r:id="rId10"/>
+    <p:sldLayoutId id="2147483654" r:id="rId5"/>
+    <p:sldLayoutId id="2147483655" r:id="rId6"/>
+    <p:sldLayoutId id="2147483657" r:id="rId7"/>
+    <p:sldLayoutId id="2147483658" r:id="rId8"/>
+    <p:sldLayoutId id="2147483659" r:id="rId9"/>
   </p:sldLayoutIdLst>
   <p:transition spd="med"/>
   <p:txStyles>
@@ -18211,7 +17976,7 @@
           </a:ln>
           <a:extLst>
             <a:ext uri="{C572A759-6A51-4108-AA02-DFA0A04FC94B}">
-              <ma14:wrappingTextBoxFlag xmlns="" xmlns:m="http://schemas.openxmlformats.org/officeDocument/2006/math" xmlns:a14="http://schemas.microsoft.com/office/drawing/2010/main" xmlns:ma14="http://schemas.microsoft.com/office/mac/drawingml/2011/main" val="1"/>
+              <ma14:wrappingTextBoxFlag xmlns:ma14="http://schemas.microsoft.com/office/mac/drawingml/2011/main" xmlns:a14="http://schemas.microsoft.com/office/drawing/2010/main" xmlns:m="http://schemas.openxmlformats.org/officeDocument/2006/math" xmlns="" val="1"/>
             </a:ext>
           </a:extLst>
         </p:spPr>
@@ -19573,137 +19338,6 @@
       </p:grpSpPr>
       <p:sp>
         <p:nvSpPr>
-          <p:cNvPr id="2" name="Title 1"/>
-          <p:cNvSpPr>
-            <a:spLocks noGrp="1"/>
-          </p:cNvSpPr>
-          <p:nvPr>
-            <p:ph type="title"/>
-          </p:nvPr>
-        </p:nvSpPr>
-        <p:spPr/>
-        <p:txBody>
-          <a:bodyPr/>
-          <a:lstStyle/>
-          <a:p>
-            <a:r>
-              <a:rPr lang="en-US" dirty="0" smtClean="0"/>
-              <a:t>Dataset</a:t>
-            </a:r>
-            <a:endParaRPr lang="en-US" dirty="0"/>
-          </a:p>
-        </p:txBody>
-      </p:sp>
-      <p:sp>
-        <p:nvSpPr>
-          <p:cNvPr id="4" name="Text Placeholder 3"/>
-          <p:cNvSpPr>
-            <a:spLocks noGrp="1"/>
-          </p:cNvSpPr>
-          <p:nvPr>
-            <p:ph type="body" sz="quarter" idx="13"/>
-          </p:nvPr>
-        </p:nvSpPr>
-        <p:spPr>
-          <a:xfrm>
-            <a:off x="1371601" y="2794000"/>
-            <a:ext cx="3937000" cy="1524000"/>
-          </a:xfrm>
-        </p:spPr>
-        <p:txBody>
-          <a:bodyPr>
-            <a:normAutofit/>
-          </a:bodyPr>
-          <a:lstStyle/>
-          <a:p>
-            <a:r>
-              <a:rPr lang="en-US" dirty="0"/>
-              <a:t>3,094 articles published Sept. – Dec. 2020</a:t>
-            </a:r>
-          </a:p>
-          <a:p>
-            <a:r>
-              <a:rPr lang="en-US" dirty="0"/>
-              <a:t>9 news sources w/ Pew Research Center bias </a:t>
-            </a:r>
-            <a:r>
-              <a:rPr lang="en-US" dirty="0" smtClean="0"/>
-              <a:t>ratings</a:t>
-            </a:r>
-            <a:endParaRPr lang="en-US" dirty="0"/>
-          </a:p>
-        </p:txBody>
-      </p:sp>
-      <p:pic>
-        <p:nvPicPr>
-          <p:cNvPr id="3" name="Picture 2"/>
-          <p:cNvPicPr>
-            <a:picLocks noChangeAspect="1"/>
-          </p:cNvPicPr>
-          <p:nvPr/>
-        </p:nvPicPr>
-        <p:blipFill>
-          <a:blip r:embed="rId2">
-            <a:extLst>
-              <a:ext uri="{28A0092B-C50C-407E-A947-70E740481C1C}">
-                <a14:useLocalDpi xmlns:a14="http://schemas.microsoft.com/office/drawing/2010/main" val="0"/>
-              </a:ext>
-            </a:extLst>
-          </a:blip>
-          <a:stretch>
-            <a:fillRect/>
-          </a:stretch>
-        </p:blipFill>
-        <p:spPr>
-          <a:xfrm>
-            <a:off x="5970495" y="1674849"/>
-            <a:ext cx="5734410" cy="3753684"/>
-          </a:xfrm>
-          <a:prstGeom prst="rect">
-            <a:avLst/>
-          </a:prstGeom>
-        </p:spPr>
-      </p:pic>
-    </p:spTree>
-    <p:extLst>
-      <p:ext uri="{BB962C8B-B14F-4D97-AF65-F5344CB8AC3E}">
-        <p14:creationId xmlns:p14="http://schemas.microsoft.com/office/powerpoint/2010/main" val="3548561940"/>
-      </p:ext>
-    </p:extLst>
-  </p:cSld>
-  <p:clrMapOvr>
-    <a:masterClrMapping/>
-  </p:clrMapOvr>
-  <p:transition spd="med"/>
-  <p:timing>
-    <p:tnLst>
-      <p:par>
-        <p:cTn id="1" dur="indefinite" restart="never" nodeType="tmRoot"/>
-      </p:par>
-    </p:tnLst>
-  </p:timing>
-</p:sld>
-</file>
-
-<file path=ppt/slides/slide5.xml><?xml version="1.0" encoding="utf-8"?>
-<p:sld xmlns:a="http://schemas.openxmlformats.org/drawingml/2006/main" xmlns:r="http://schemas.openxmlformats.org/officeDocument/2006/relationships" xmlns:p="http://schemas.openxmlformats.org/presentationml/2006/main">
-  <p:cSld>
-    <p:spTree>
-      <p:nvGrpSpPr>
-        <p:cNvPr id="1" name=""/>
-        <p:cNvGrpSpPr/>
-        <p:nvPr/>
-      </p:nvGrpSpPr>
-      <p:grpSpPr>
-        <a:xfrm>
-          <a:off x="0" y="0"/>
-          <a:ext cx="0" cy="0"/>
-          <a:chOff x="0" y="0"/>
-          <a:chExt cx="0" cy="0"/>
-        </a:xfrm>
-      </p:grpSpPr>
-      <p:sp>
-        <p:nvSpPr>
           <p:cNvPr id="136" name="Sentiment By News Source"/>
           <p:cNvSpPr txBox="1">
             <a:spLocks noGrp="1"/>
@@ -19749,7 +19383,7 @@
         </p:blipFill>
         <p:spPr>
           <a:xfrm>
-            <a:off x="2841079" y="1549101"/>
+            <a:off x="721814" y="1549101"/>
             <a:ext cx="6662241" cy="5308899"/>
           </a:xfrm>
           <a:prstGeom prst="rect">
@@ -19764,14 +19398,14 @@
           <p:nvPr>
             <p:extLst>
               <p:ext uri="{D42A27DB-BD31-4B8C-83A1-F6EECF244321}">
-                <p14:modId xmlns:p14="http://schemas.microsoft.com/office/powerpoint/2010/main" val="3703730016"/>
+                <p14:modId xmlns:p14="http://schemas.microsoft.com/office/powerpoint/2010/main" val="4122579704"/>
               </p:ext>
             </p:extLst>
           </p:nvPr>
         </p:nvGraphicFramePr>
         <p:xfrm>
-          <a:off x="9950817" y="2844850"/>
-          <a:ext cx="1672215" cy="2717400"/>
+          <a:off x="7379758" y="4450699"/>
+          <a:ext cx="1269390" cy="2229802"/>
         </p:xfrm>
         <a:graphic>
           <a:graphicData uri="http://schemas.openxmlformats.org/drawingml/2006/diagram">
@@ -19779,6 +19413,49 @@
           </a:graphicData>
         </a:graphic>
       </p:graphicFrame>
+      <p:sp>
+        <p:nvSpPr>
+          <p:cNvPr id="6" name="Text Placeholder 3"/>
+          <p:cNvSpPr>
+            <a:spLocks noGrp="1"/>
+          </p:cNvSpPr>
+          <p:nvPr>
+            <p:ph type="body" sz="quarter" idx="4294967295"/>
+          </p:nvPr>
+        </p:nvSpPr>
+        <p:spPr>
+          <a:xfrm>
+            <a:off x="8033841" y="2033201"/>
+            <a:ext cx="3712447" cy="1861054"/>
+          </a:xfrm>
+          <a:prstGeom prst="rect">
+            <a:avLst/>
+          </a:prstGeom>
+        </p:spPr>
+        <p:txBody>
+          <a:bodyPr>
+            <a:normAutofit/>
+          </a:bodyPr>
+          <a:lstStyle/>
+          <a:p>
+            <a:r>
+              <a:rPr lang="en-US" dirty="0"/>
+              <a:t>3,094 articles published Sept. – Dec. 2020</a:t>
+            </a:r>
+          </a:p>
+          <a:p>
+            <a:r>
+              <a:rPr lang="en-US" dirty="0"/>
+              <a:t>9 news sources w/ Pew Research Center bias </a:t>
+            </a:r>
+            <a:r>
+              <a:rPr lang="en-US" dirty="0" smtClean="0"/>
+              <a:t>ratings</a:t>
+            </a:r>
+            <a:endParaRPr lang="en-US" dirty="0"/>
+          </a:p>
+        </p:txBody>
+      </p:sp>
     </p:spTree>
   </p:cSld>
   <p:clrMapOvr>
@@ -19792,6 +19469,90 @@
       </p:par>
     </p:tnLst>
   </p:timing>
+</p:sld>
+</file>
+
+<file path=ppt/slides/slide5.xml><?xml version="1.0" encoding="utf-8"?>
+<p:sld xmlns:a="http://schemas.openxmlformats.org/drawingml/2006/main" xmlns:r="http://schemas.openxmlformats.org/officeDocument/2006/relationships" xmlns:p="http://schemas.openxmlformats.org/presentationml/2006/main">
+  <p:cSld>
+    <p:spTree>
+      <p:nvGrpSpPr>
+        <p:cNvPr id="1" name=""/>
+        <p:cNvGrpSpPr/>
+        <p:nvPr/>
+      </p:nvGrpSpPr>
+      <p:grpSpPr>
+        <a:xfrm>
+          <a:off x="0" y="0"/>
+          <a:ext cx="0" cy="0"/>
+          <a:chOff x="0" y="0"/>
+          <a:chExt cx="0" cy="0"/>
+        </a:xfrm>
+      </p:grpSpPr>
+      <p:sp>
+        <p:nvSpPr>
+          <p:cNvPr id="2" name="Title 1"/>
+          <p:cNvSpPr>
+            <a:spLocks noGrp="1"/>
+          </p:cNvSpPr>
+          <p:nvPr>
+            <p:ph type="title"/>
+          </p:nvPr>
+        </p:nvSpPr>
+        <p:spPr/>
+        <p:txBody>
+          <a:bodyPr/>
+          <a:lstStyle/>
+          <a:p>
+            <a:r>
+              <a:rPr lang="en-US" dirty="0" smtClean="0"/>
+              <a:t>Bias and Negative Sentiment</a:t>
+            </a:r>
+            <a:endParaRPr lang="en-US" dirty="0"/>
+          </a:p>
+        </p:txBody>
+      </p:sp>
+      <p:pic>
+        <p:nvPicPr>
+          <p:cNvPr id="5" name="Picture 4"/>
+          <p:cNvPicPr>
+            <a:picLocks noChangeAspect="1"/>
+          </p:cNvPicPr>
+          <p:nvPr/>
+        </p:nvPicPr>
+        <p:blipFill>
+          <a:blip r:embed="rId2">
+            <a:extLst>
+              <a:ext uri="{28A0092B-C50C-407E-A947-70E740481C1C}">
+                <a14:useLocalDpi xmlns:a14="http://schemas.microsoft.com/office/drawing/2010/main" val="0"/>
+              </a:ext>
+            </a:extLst>
+          </a:blip>
+          <a:stretch>
+            <a:fillRect/>
+          </a:stretch>
+        </p:blipFill>
+        <p:spPr>
+          <a:xfrm>
+            <a:off x="2457002" y="1535882"/>
+            <a:ext cx="7430396" cy="4953598"/>
+          </a:xfrm>
+          <a:prstGeom prst="rect">
+            <a:avLst/>
+          </a:prstGeom>
+        </p:spPr>
+      </p:pic>
+    </p:spTree>
+    <p:extLst>
+      <p:ext uri="{BB962C8B-B14F-4D97-AF65-F5344CB8AC3E}">
+        <p14:creationId xmlns:p14="http://schemas.microsoft.com/office/powerpoint/2010/main" val="1655655677"/>
+      </p:ext>
+    </p:extLst>
+  </p:cSld>
+  <p:clrMapOvr>
+    <a:masterClrMapping/>
+  </p:clrMapOvr>
+  <p:transition spd="med"/>
 </p:sld>
 </file>
 

</xml_diff>